<commit_message>
Updated PowerPoint and added references to inspiration for Poisson blender
</commit_message>
<xml_diff>
--- a/534_pres.pptx
+++ b/534_pres.pptx
@@ -15,7 +15,8 @@
     <p:sldId id="263" r:id="rId9"/>
     <p:sldId id="264" r:id="rId10"/>
     <p:sldId id="265" r:id="rId11"/>
-    <p:sldId id="266" r:id="rId12"/>
+    <p:sldId id="267" r:id="rId12"/>
+    <p:sldId id="266" r:id="rId13"/>
   </p:sldIdLst>
   <p:sldSz cx="12192000" cy="6858000"/>
   <p:notesSz cx="6858000" cy="9144000"/>
@@ -114,6 +115,11 @@
       </a:defRPr>
     </a:lvl9pPr>
   </p:defaultTextStyle>
+  <p:extLst>
+    <p:ext uri="{EFAFB233-063F-42B5-8137-9DF3F51BA10A}">
+      <p15:sldGuideLst xmlns:p15="http://schemas.microsoft.com/office/powerpoint/2012/main"/>
+    </p:ext>
+  </p:extLst>
 </p:presentation>
 </file>
 
@@ -1072,14 +1078,35 @@
         </dgm:presLayoutVars>
       </dgm:prSet>
       <dgm:spPr/>
+      <dgm:t>
+        <a:bodyPr/>
+        <a:lstStyle/>
+        <a:p>
+          <a:endParaRPr lang="en-US"/>
+        </a:p>
+      </dgm:t>
     </dgm:pt>
     <dgm:pt modelId="{2775E1BF-2D5B-7C43-AE4C-29EDDD9385A6}" type="pres">
       <dgm:prSet presAssocID="{9EBDBCA8-37AC-C747-8307-01CC1205F28E}" presName="sibTrans" presStyleLbl="sibTrans2D1" presStyleIdx="0" presStyleCnt="4"/>
       <dgm:spPr/>
+      <dgm:t>
+        <a:bodyPr/>
+        <a:lstStyle/>
+        <a:p>
+          <a:endParaRPr lang="en-US"/>
+        </a:p>
+      </dgm:t>
     </dgm:pt>
     <dgm:pt modelId="{25CA4689-2A55-BE45-B361-D114BEF493C9}" type="pres">
       <dgm:prSet presAssocID="{9EBDBCA8-37AC-C747-8307-01CC1205F28E}" presName="connectorText" presStyleLbl="sibTrans2D1" presStyleIdx="0" presStyleCnt="4"/>
       <dgm:spPr/>
+      <dgm:t>
+        <a:bodyPr/>
+        <a:lstStyle/>
+        <a:p>
+          <a:endParaRPr lang="en-US"/>
+        </a:p>
+      </dgm:t>
     </dgm:pt>
     <dgm:pt modelId="{E589A13C-74D7-3346-8656-8273E54FB12C}" type="pres">
       <dgm:prSet presAssocID="{E7D77789-D19A-9540-8A5A-4F8555AD74CC}" presName="node" presStyleLbl="node1" presStyleIdx="1" presStyleCnt="5">
@@ -1099,10 +1126,24 @@
     <dgm:pt modelId="{590E1E2D-95E0-F54B-823A-1701BB5B62A7}" type="pres">
       <dgm:prSet presAssocID="{2B3EEBB5-4078-B447-A7AC-B66F1A1E975C}" presName="sibTrans" presStyleLbl="sibTrans2D1" presStyleIdx="1" presStyleCnt="4"/>
       <dgm:spPr/>
+      <dgm:t>
+        <a:bodyPr/>
+        <a:lstStyle/>
+        <a:p>
+          <a:endParaRPr lang="en-US"/>
+        </a:p>
+      </dgm:t>
     </dgm:pt>
     <dgm:pt modelId="{9C695EA9-6170-E149-B16D-F711C81F8F83}" type="pres">
       <dgm:prSet presAssocID="{2B3EEBB5-4078-B447-A7AC-B66F1A1E975C}" presName="connectorText" presStyleLbl="sibTrans2D1" presStyleIdx="1" presStyleCnt="4"/>
       <dgm:spPr/>
+      <dgm:t>
+        <a:bodyPr/>
+        <a:lstStyle/>
+        <a:p>
+          <a:endParaRPr lang="en-US"/>
+        </a:p>
+      </dgm:t>
     </dgm:pt>
     <dgm:pt modelId="{3FAB3615-0EB8-724E-9DDD-8C36B6E4A7A1}" type="pres">
       <dgm:prSet presAssocID="{90F0F106-FC5B-444F-90CF-187CFE89A63B}" presName="node" presStyleLbl="node1" presStyleIdx="2" presStyleCnt="5">
@@ -1122,10 +1163,24 @@
     <dgm:pt modelId="{C330A8D0-62C0-7647-80D0-1B1D8E2AC668}" type="pres">
       <dgm:prSet presAssocID="{3598FE2E-B681-134E-B51C-82D47F92CB27}" presName="sibTrans" presStyleLbl="sibTrans2D1" presStyleIdx="2" presStyleCnt="4"/>
       <dgm:spPr/>
+      <dgm:t>
+        <a:bodyPr/>
+        <a:lstStyle/>
+        <a:p>
+          <a:endParaRPr lang="en-US"/>
+        </a:p>
+      </dgm:t>
     </dgm:pt>
     <dgm:pt modelId="{184C40AA-5F53-F042-9189-EAB587B17F7C}" type="pres">
       <dgm:prSet presAssocID="{3598FE2E-B681-134E-B51C-82D47F92CB27}" presName="connectorText" presStyleLbl="sibTrans2D1" presStyleIdx="2" presStyleCnt="4"/>
       <dgm:spPr/>
+      <dgm:t>
+        <a:bodyPr/>
+        <a:lstStyle/>
+        <a:p>
+          <a:endParaRPr lang="en-US"/>
+        </a:p>
+      </dgm:t>
     </dgm:pt>
     <dgm:pt modelId="{369CE24A-0E22-EF46-9D02-17707CACCBDA}" type="pres">
       <dgm:prSet presAssocID="{045013EC-7901-534C-8B8E-E348AAA27BF0}" presName="node" presStyleLbl="node1" presStyleIdx="3" presStyleCnt="5">
@@ -1134,14 +1189,35 @@
         </dgm:presLayoutVars>
       </dgm:prSet>
       <dgm:spPr/>
+      <dgm:t>
+        <a:bodyPr/>
+        <a:lstStyle/>
+        <a:p>
+          <a:endParaRPr lang="en-US"/>
+        </a:p>
+      </dgm:t>
     </dgm:pt>
     <dgm:pt modelId="{D17195DD-2FAE-0A46-9628-E06EAF5E6149}" type="pres">
       <dgm:prSet presAssocID="{EE158F42-23B5-F744-819A-ED4215733F25}" presName="sibTrans" presStyleLbl="sibTrans2D1" presStyleIdx="3" presStyleCnt="4"/>
       <dgm:spPr/>
+      <dgm:t>
+        <a:bodyPr/>
+        <a:lstStyle/>
+        <a:p>
+          <a:endParaRPr lang="en-US"/>
+        </a:p>
+      </dgm:t>
     </dgm:pt>
     <dgm:pt modelId="{B0BFDA82-0223-B542-95D4-E8249FEC267A}" type="pres">
       <dgm:prSet presAssocID="{EE158F42-23B5-F744-819A-ED4215733F25}" presName="connectorText" presStyleLbl="sibTrans2D1" presStyleIdx="3" presStyleCnt="4"/>
       <dgm:spPr/>
+      <dgm:t>
+        <a:bodyPr/>
+        <a:lstStyle/>
+        <a:p>
+          <a:endParaRPr lang="en-US"/>
+        </a:p>
+      </dgm:t>
     </dgm:pt>
     <dgm:pt modelId="{6E2BB16B-90DD-644D-A8AD-FD6EB959E509}" type="pres">
       <dgm:prSet presAssocID="{E93AE06F-D309-B344-A27A-091D2C6B64D1}" presName="node" presStyleLbl="node1" presStyleIdx="4" presStyleCnt="5">
@@ -1150,6 +1226,13 @@
         </dgm:presLayoutVars>
       </dgm:prSet>
       <dgm:spPr/>
+      <dgm:t>
+        <a:bodyPr/>
+        <a:lstStyle/>
+        <a:p>
+          <a:endParaRPr lang="en-US"/>
+        </a:p>
+      </dgm:t>
     </dgm:pt>
   </dgm:ptLst>
   <dgm:cxnLst>
@@ -1163,15 +1246,15 @@
     <dgm:cxn modelId="{E2C011BF-0224-BA4F-BB41-CBF34498C3D4}" type="presOf" srcId="{E7D77789-D19A-9540-8A5A-4F8555AD74CC}" destId="{E589A13C-74D7-3346-8656-8273E54FB12C}" srcOrd="0" destOrd="0" presId="urn:microsoft.com/office/officeart/2005/8/layout/process1"/>
     <dgm:cxn modelId="{E69E63DE-8F64-3643-A5D5-B5301ACA1EAE}" type="presOf" srcId="{90F0F106-FC5B-444F-90CF-187CFE89A63B}" destId="{3FAB3615-0EB8-724E-9DDD-8C36B6E4A7A1}" srcOrd="0" destOrd="0" presId="urn:microsoft.com/office/officeart/2005/8/layout/process1"/>
     <dgm:cxn modelId="{FADE4645-A23F-EE42-8591-CCADD04E950A}" srcId="{D410A61B-9352-594D-92B2-49809D6894F7}" destId="{E7D77789-D19A-9540-8A5A-4F8555AD74CC}" srcOrd="1" destOrd="0" parTransId="{2D2145B3-A7B7-A344-88EB-3F75BA871D80}" sibTransId="{2B3EEBB5-4078-B447-A7AC-B66F1A1E975C}"/>
+    <dgm:cxn modelId="{FE8FC3F5-A970-D744-8ABC-6F3F8E4A3E7C}" type="presOf" srcId="{EE158F42-23B5-F744-819A-ED4215733F25}" destId="{D17195DD-2FAE-0A46-9628-E06EAF5E6149}" srcOrd="0" destOrd="0" presId="urn:microsoft.com/office/officeart/2005/8/layout/process1"/>
     <dgm:cxn modelId="{869F49E0-31B8-CD42-A87B-DA9410B08916}" type="presOf" srcId="{3598FE2E-B681-134E-B51C-82D47F92CB27}" destId="{184C40AA-5F53-F042-9189-EAB587B17F7C}" srcOrd="1" destOrd="0" presId="urn:microsoft.com/office/officeart/2005/8/layout/process1"/>
-    <dgm:cxn modelId="{FE8FC3F5-A970-D744-8ABC-6F3F8E4A3E7C}" type="presOf" srcId="{EE158F42-23B5-F744-819A-ED4215733F25}" destId="{D17195DD-2FAE-0A46-9628-E06EAF5E6149}" srcOrd="0" destOrd="0" presId="urn:microsoft.com/office/officeart/2005/8/layout/process1"/>
     <dgm:cxn modelId="{CE972473-23A3-C941-B95B-CB04CF11C036}" srcId="{D410A61B-9352-594D-92B2-49809D6894F7}" destId="{E93AE06F-D309-B344-A27A-091D2C6B64D1}" srcOrd="4" destOrd="0" parTransId="{CB9A2F40-5363-4345-AEF0-CBFC5ECABFA8}" sibTransId="{51E09C1C-C95E-2340-A3C4-6EA1A0EAEBB1}"/>
     <dgm:cxn modelId="{260E454D-922D-9446-84D7-1F174C28260D}" type="presOf" srcId="{9EBDBCA8-37AC-C747-8307-01CC1205F28E}" destId="{25CA4689-2A55-BE45-B361-D114BEF493C9}" srcOrd="1" destOrd="0" presId="urn:microsoft.com/office/officeart/2005/8/layout/process1"/>
+    <dgm:cxn modelId="{DA896CF3-4093-7C46-9DBF-DB2386D25631}" srcId="{D410A61B-9352-594D-92B2-49809D6894F7}" destId="{5A468017-4B18-7743-BE22-4BDAAF9F2C9A}" srcOrd="0" destOrd="0" parTransId="{3052306A-3841-D048-A421-B1A8B3B30F39}" sibTransId="{9EBDBCA8-37AC-C747-8307-01CC1205F28E}"/>
     <dgm:cxn modelId="{4BE32BC8-300B-CA4C-B1DE-0E5D25A4E961}" type="presOf" srcId="{2B3EEBB5-4078-B447-A7AC-B66F1A1E975C}" destId="{9C695EA9-6170-E149-B16D-F711C81F8F83}" srcOrd="1" destOrd="0" presId="urn:microsoft.com/office/officeart/2005/8/layout/process1"/>
-    <dgm:cxn modelId="{DA896CF3-4093-7C46-9DBF-DB2386D25631}" srcId="{D410A61B-9352-594D-92B2-49809D6894F7}" destId="{5A468017-4B18-7743-BE22-4BDAAF9F2C9A}" srcOrd="0" destOrd="0" parTransId="{3052306A-3841-D048-A421-B1A8B3B30F39}" sibTransId="{9EBDBCA8-37AC-C747-8307-01CC1205F28E}"/>
     <dgm:cxn modelId="{DD198553-BB6F-0343-B8B2-9CD97D653E96}" type="presOf" srcId="{5A468017-4B18-7743-BE22-4BDAAF9F2C9A}" destId="{ED626B74-BE43-964D-873B-E5C023D7C29A}" srcOrd="0" destOrd="0" presId="urn:microsoft.com/office/officeart/2005/8/layout/process1"/>
+    <dgm:cxn modelId="{B1B2B347-8EB7-574E-8238-344EB497816D}" srcId="{D410A61B-9352-594D-92B2-49809D6894F7}" destId="{045013EC-7901-534C-8B8E-E348AAA27BF0}" srcOrd="3" destOrd="0" parTransId="{1DDE25B2-A535-7344-A7F0-A28363777164}" sibTransId="{EE158F42-23B5-F744-819A-ED4215733F25}"/>
     <dgm:cxn modelId="{A7C56AF2-D18F-9A44-B173-866C2F5801D9}" type="presOf" srcId="{E93AE06F-D309-B344-A27A-091D2C6B64D1}" destId="{6E2BB16B-90DD-644D-A8AD-FD6EB959E509}" srcOrd="0" destOrd="0" presId="urn:microsoft.com/office/officeart/2005/8/layout/process1"/>
-    <dgm:cxn modelId="{B1B2B347-8EB7-574E-8238-344EB497816D}" srcId="{D410A61B-9352-594D-92B2-49809D6894F7}" destId="{045013EC-7901-534C-8B8E-E348AAA27BF0}" srcOrd="3" destOrd="0" parTransId="{1DDE25B2-A535-7344-A7F0-A28363777164}" sibTransId="{EE158F42-23B5-F744-819A-ED4215733F25}"/>
     <dgm:cxn modelId="{17127C32-5922-D044-B0AD-18A1C7F18363}" type="presParOf" srcId="{1496CEA9-8236-7C4B-B4C7-8FB49B738452}" destId="{ED626B74-BE43-964D-873B-E5C023D7C29A}" srcOrd="0" destOrd="0" presId="urn:microsoft.com/office/officeart/2005/8/layout/process1"/>
     <dgm:cxn modelId="{77D1BBF1-C67A-514B-A6B6-332F5D878E66}" type="presParOf" srcId="{1496CEA9-8236-7C4B-B4C7-8FB49B738452}" destId="{2775E1BF-2D5B-7C43-AE4C-29EDDD9385A6}" srcOrd="1" destOrd="0" presId="urn:microsoft.com/office/officeart/2005/8/layout/process1"/>
     <dgm:cxn modelId="{A38B99CB-F05E-B642-BF71-1B30CCC9583E}" type="presParOf" srcId="{2775E1BF-2D5B-7C43-AE4C-29EDDD9385A6}" destId="{25CA4689-2A55-BE45-B361-D114BEF493C9}" srcOrd="0" destOrd="0" presId="urn:microsoft.com/office/officeart/2005/8/layout/process1"/>
@@ -3253,7 +3336,7 @@
           <a:effectLst/>
           <a:extLst>
             <a:ext uri="{91240B29-F687-4f45-9708-019B960494DF}">
-              <a14:hiddenLine xmlns:a14="http://schemas.microsoft.com/office/drawing/2010/main" xmlns="" w="9525">
+              <a14:hiddenLine xmlns="" xmlns:a14="http://schemas.microsoft.com/office/drawing/2010/main" w="9525">
                 <a:solidFill>
                   <a:srgbClr val="000000"/>
                 </a:solidFill>
@@ -3446,7 +3529,7 @@
             <a:fld id="{08B9EBBA-996F-894A-B54A-D6246ED52CEA}" type="datetimeFigureOut">
               <a:rPr lang="en-US" dirty="0"/>
               <a:pPr/>
-              <a:t>12/11/16</a:t>
+              <a:t>12/14/2016</a:t>
             </a:fld>
             <a:endParaRPr lang="en-US" dirty="0"/>
           </a:p>
@@ -3761,7 +3844,7 @@
             <a:fld id="{18C79C5D-2A6F-F04D-97DA-BEF2467B64E4}" type="datetimeFigureOut">
               <a:rPr lang="en-US" dirty="0"/>
               <a:pPr/>
-              <a:t>12/11/16</a:t>
+              <a:t>12/14/2016</a:t>
             </a:fld>
             <a:endParaRPr lang="en-US" dirty="0"/>
           </a:p>
@@ -4246,7 +4329,7 @@
             <a:fld id="{8DFA1846-DA80-1C48-A609-854EA85C59AD}" type="datetimeFigureOut">
               <a:rPr lang="en-US" dirty="0"/>
               <a:pPr/>
-              <a:t>12/11/16</a:t>
+              <a:t>12/14/2016</a:t>
             </a:fld>
             <a:endParaRPr lang="en-US" dirty="0"/>
           </a:p>
@@ -4612,7 +4695,7 @@
             <a:fld id="{FBF54567-0DE4-3F47-BF90-CB84690072F9}" type="datetimeFigureOut">
               <a:rPr lang="en-US" dirty="0"/>
               <a:pPr/>
-              <a:t>12/11/16</a:t>
+              <a:t>12/14/2016</a:t>
             </a:fld>
             <a:endParaRPr lang="en-US" dirty="0"/>
           </a:p>
@@ -4763,7 +4846,7 @@
           <a:ln/>
           <a:extLst>
             <a:ext uri="{91240B29-F687-4f45-9708-019B960494DF}">
-              <a14:hiddenLine xmlns:a14="http://schemas.microsoft.com/office/drawing/2010/main" xmlns="" w="9525">
+              <a14:hiddenLine xmlns="" xmlns:a14="http://schemas.microsoft.com/office/drawing/2010/main" w="9525">
                 <a:solidFill>
                   <a:srgbClr val="000000"/>
                 </a:solidFill>
@@ -4882,7 +4965,7 @@
             <a:fld id="{C6C52C72-DE31-F449-A4ED-4C594FD91407}" type="datetimeFigureOut">
               <a:rPr lang="en-US" dirty="0"/>
               <a:pPr/>
-              <a:t>12/11/16</a:t>
+              <a:t>12/14/2016</a:t>
             </a:fld>
             <a:endParaRPr lang="en-US" dirty="0"/>
           </a:p>
@@ -5035,7 +5118,7 @@
           <a:ln/>
           <a:extLst>
             <a:ext uri="{91240B29-F687-4f45-9708-019B960494DF}">
-              <a14:hiddenLine xmlns:a14="http://schemas.microsoft.com/office/drawing/2010/main" xmlns="" w="9525">
+              <a14:hiddenLine xmlns="" xmlns:a14="http://schemas.microsoft.com/office/drawing/2010/main" w="9525">
                 <a:solidFill>
                   <a:srgbClr val="000000"/>
                 </a:solidFill>
@@ -5164,7 +5247,7 @@
             <a:fld id="{ED62726E-379B-B349-9EED-81ED093FA806}" type="datetimeFigureOut">
               <a:rPr lang="en-US" dirty="0"/>
               <a:pPr/>
-              <a:t>12/11/16</a:t>
+              <a:t>12/14/2016</a:t>
             </a:fld>
             <a:endParaRPr lang="en-US" dirty="0"/>
           </a:p>
@@ -5315,7 +5398,7 @@
           <a:ln/>
           <a:extLst>
             <a:ext uri="{91240B29-F687-4f45-9708-019B960494DF}">
-              <a14:hiddenLine xmlns:a14="http://schemas.microsoft.com/office/drawing/2010/main" xmlns="" w="9525">
+              <a14:hiddenLine xmlns="" xmlns:a14="http://schemas.microsoft.com/office/drawing/2010/main" w="9525">
                 <a:solidFill>
                   <a:srgbClr val="000000"/>
                 </a:solidFill>
@@ -5444,7 +5527,7 @@
             <a:fld id="{9B3A1323-8D79-1946-B0D7-40001CF92E9D}" type="datetimeFigureOut">
               <a:rPr lang="en-US" dirty="0"/>
               <a:pPr/>
-              <a:t>12/11/16</a:t>
+              <a:t>12/14/2016</a:t>
             </a:fld>
             <a:endParaRPr lang="en-US" dirty="0"/>
           </a:p>
@@ -5784,7 +5867,7 @@
             <a:fld id="{8DFA1846-DA80-1C48-A609-854EA85C59AD}" type="datetimeFigureOut">
               <a:rPr lang="en-US" dirty="0"/>
               <a:pPr/>
-              <a:t>12/11/16</a:t>
+              <a:t>12/14/2016</a:t>
             </a:fld>
             <a:endParaRPr lang="en-US" dirty="0"/>
           </a:p>
@@ -5935,7 +6018,7 @@
           <a:ln/>
           <a:extLst>
             <a:ext uri="{91240B29-F687-4f45-9708-019B960494DF}">
-              <a14:hiddenLine xmlns:a14="http://schemas.microsoft.com/office/drawing/2010/main" xmlns="" w="9525">
+              <a14:hiddenLine xmlns="" xmlns:a14="http://schemas.microsoft.com/office/drawing/2010/main" w="9525">
                 <a:solidFill>
                   <a:srgbClr val="000000"/>
                 </a:solidFill>
@@ -6120,7 +6203,7 @@
             <a:fld id="{57302355-E14B-8545-A8F8-0FE83CC9D524}" type="datetimeFigureOut">
               <a:rPr lang="en-US" dirty="0"/>
               <a:pPr/>
-              <a:t>12/11/16</a:t>
+              <a:t>12/14/2016</a:t>
             </a:fld>
             <a:endParaRPr lang="en-US" dirty="0"/>
           </a:p>
@@ -6271,7 +6354,7 @@
           <a:ln/>
           <a:extLst>
             <a:ext uri="{91240B29-F687-4f45-9708-019B960494DF}">
-              <a14:hiddenLine xmlns:a14="http://schemas.microsoft.com/office/drawing/2010/main" xmlns="" w="9525">
+              <a14:hiddenLine xmlns="" xmlns:a14="http://schemas.microsoft.com/office/drawing/2010/main" w="9525">
                 <a:solidFill>
                   <a:srgbClr val="000000"/>
                 </a:solidFill>
@@ -6594,7 +6677,7 @@
             <a:fld id="{02640F58-564D-2B4F-AE67-E407BA4FCF45}" type="datetimeFigureOut">
               <a:rPr lang="en-US" dirty="0"/>
               <a:pPr/>
-              <a:t>12/11/16</a:t>
+              <a:t>12/14/2016</a:t>
             </a:fld>
             <a:endParaRPr lang="en-US" dirty="0"/>
           </a:p>
@@ -6745,7 +6828,7 @@
           <a:ln/>
           <a:extLst>
             <a:ext uri="{91240B29-F687-4f45-9708-019B960494DF}">
-              <a14:hiddenLine xmlns:a14="http://schemas.microsoft.com/office/drawing/2010/main" xmlns="" w="9525">
+              <a14:hiddenLine xmlns="" xmlns:a14="http://schemas.microsoft.com/office/drawing/2010/main" w="9525">
                 <a:solidFill>
                   <a:srgbClr val="000000"/>
                 </a:solidFill>
@@ -6812,7 +6895,7 @@
             <a:fld id="{F13A34C8-038E-2045-AF43-DF7DBB8E0E9E}" type="datetimeFigureOut">
               <a:rPr lang="en-US" dirty="0"/>
               <a:pPr/>
-              <a:t>12/11/16</a:t>
+              <a:t>12/14/2016</a:t>
             </a:fld>
             <a:endParaRPr lang="en-US" dirty="0"/>
           </a:p>
@@ -6904,7 +6987,7 @@
             <a:fld id="{8818C68F-D26B-8F47-958C-23B49CF8A634}" type="datetimeFigureOut">
               <a:rPr lang="en-US" dirty="0"/>
               <a:pPr/>
-              <a:t>12/11/16</a:t>
+              <a:t>12/14/2016</a:t>
             </a:fld>
             <a:endParaRPr lang="en-US" dirty="0"/>
           </a:p>
@@ -7168,7 +7251,7 @@
           <a:ln/>
           <a:extLst>
             <a:ext uri="{91240B29-F687-4f45-9708-019B960494DF}">
-              <a14:hiddenLine xmlns:a14="http://schemas.microsoft.com/office/drawing/2010/main" xmlns="" w="9525">
+              <a14:hiddenLine xmlns="" xmlns:a14="http://schemas.microsoft.com/office/drawing/2010/main" w="9525">
                 <a:solidFill>
                   <a:srgbClr val="000000"/>
                 </a:solidFill>
@@ -7368,7 +7451,7 @@
             <a:fld id="{D0DF5E60-9974-AC48-9591-99C2BB44B7CF}" type="datetimeFigureOut">
               <a:rPr lang="en-US" dirty="0"/>
               <a:pPr/>
-              <a:t>12/11/16</a:t>
+              <a:t>12/14/2016</a:t>
             </a:fld>
             <a:endParaRPr lang="en-US" dirty="0"/>
           </a:p>
@@ -7678,7 +7761,7 @@
             <a:fld id="{18C79C5D-2A6F-F04D-97DA-BEF2467B64E4}" type="datetimeFigureOut">
               <a:rPr lang="en-US" dirty="0"/>
               <a:pPr/>
-              <a:t>12/11/16</a:t>
+              <a:t>12/14/2016</a:t>
             </a:fld>
             <a:endParaRPr lang="en-US" dirty="0"/>
           </a:p>
@@ -7945,7 +8028,7 @@
             <a:fld id="{09B482E8-6E0E-1B4F-B1FD-C69DB9E858D9}" type="datetimeFigureOut">
               <a:rPr lang="en-US" dirty="0"/>
               <a:pPr/>
-              <a:t>12/11/16</a:t>
+              <a:t>12/14/2016</a:t>
             </a:fld>
             <a:endParaRPr lang="en-US" dirty="0"/>
           </a:p>
@@ -8422,7 +8505,23 @@
             </a:br>
             <a:r>
               <a:rPr lang="en-US" dirty="0" smtClean="0"/>
-              <a:t>~TITLE NEEDED~</a:t>
+              <a:t>Image </a:t>
+            </a:r>
+            <a:r>
+              <a:rPr lang="en-US" dirty="0"/>
+              <a:t>S</a:t>
+            </a:r>
+            <a:r>
+              <a:rPr lang="en-US" dirty="0" smtClean="0"/>
+              <a:t>plicing </a:t>
+            </a:r>
+            <a:r>
+              <a:rPr lang="en-US" dirty="0"/>
+              <a:t>U</a:t>
+            </a:r>
+            <a:r>
+              <a:rPr lang="en-US" dirty="0" smtClean="0"/>
+              <a:t>sing Segmentation and Poisson Blending</a:t>
             </a:r>
             <a:endParaRPr lang="en-US" dirty="0"/>
           </a:p>
@@ -8498,7 +8597,7 @@
           <a:p>
             <a:r>
               <a:rPr lang="en-US" dirty="0" smtClean="0"/>
-              <a:t>James part, needs new title</a:t>
+              <a:t>Poisson Blending</a:t>
             </a:r>
             <a:endParaRPr lang="en-US" dirty="0"/>
           </a:p>
@@ -8519,7 +8618,62 @@
           <a:bodyPr/>
           <a:lstStyle/>
           <a:p>
-            <a:endParaRPr lang="en-US"/>
+            <a:r>
+              <a:rPr lang="en-US" dirty="0" smtClean="0"/>
+              <a:t>We need to add our image to the background and make the edges of our spliced image less obvious.</a:t>
+            </a:r>
+          </a:p>
+          <a:p>
+            <a:r>
+              <a:rPr lang="en-US" dirty="0" smtClean="0"/>
+              <a:t>Solution: Use Poisson blending to preserve the pixel gradients of the image</a:t>
+            </a:r>
+          </a:p>
+          <a:p>
+            <a:pPr marL="0" indent="0">
+              <a:buNone/>
+            </a:pPr>
+            <a:endParaRPr lang="en-US" dirty="0"/>
+          </a:p>
+          <a:p>
+            <a:endParaRPr lang="en-US" dirty="0" smtClean="0"/>
+          </a:p>
+          <a:p>
+            <a:pPr marL="0" indent="0">
+              <a:buNone/>
+            </a:pPr>
+            <a:endParaRPr lang="en-US" dirty="0"/>
+          </a:p>
+          <a:p>
+            <a:pPr marL="0" indent="0">
+              <a:buNone/>
+            </a:pPr>
+            <a:r>
+              <a:rPr lang="en-US" dirty="0" smtClean="0"/>
+              <a:t>For more information on Poisson Blending see </a:t>
+            </a:r>
+            <a:r>
+              <a:rPr lang="en-US" i="1" dirty="0" smtClean="0"/>
+              <a:t>Poisson Image </a:t>
+            </a:r>
+            <a:r>
+              <a:rPr lang="en-US" i="1" dirty="0"/>
+              <a:t>Editing</a:t>
+            </a:r>
+            <a:r>
+              <a:rPr lang="en-US" dirty="0"/>
+              <a:t> by </a:t>
+            </a:r>
+            <a:r>
+              <a:rPr lang="en-US" dirty="0"/>
+              <a:t>Pérez, et al.</a:t>
+            </a:r>
+          </a:p>
+          <a:p>
+            <a:pPr marL="0" indent="0">
+              <a:buNone/>
+            </a:pPr>
+            <a:endParaRPr lang="en-US" dirty="0"/>
           </a:p>
         </p:txBody>
       </p:sp>
@@ -8537,6 +8691,100 @@
 </file>
 
 <file path=ppt/slides/slide11.xml><?xml version="1.0" encoding="utf-8"?>
+<p:sld xmlns:a="http://schemas.openxmlformats.org/drawingml/2006/main" xmlns:r="http://schemas.openxmlformats.org/officeDocument/2006/relationships" xmlns:p="http://schemas.openxmlformats.org/presentationml/2006/main">
+  <p:cSld>
+    <p:spTree>
+      <p:nvGrpSpPr>
+        <p:cNvPr id="1" name=""/>
+        <p:cNvGrpSpPr/>
+        <p:nvPr/>
+      </p:nvGrpSpPr>
+      <p:grpSpPr>
+        <a:xfrm>
+          <a:off x="0" y="0"/>
+          <a:ext cx="0" cy="0"/>
+          <a:chOff x="0" y="0"/>
+          <a:chExt cx="0" cy="0"/>
+        </a:xfrm>
+      </p:grpSpPr>
+      <p:sp>
+        <p:nvSpPr>
+          <p:cNvPr id="2" name="Title 1"/>
+          <p:cNvSpPr>
+            <a:spLocks noGrp="1"/>
+          </p:cNvSpPr>
+          <p:nvPr>
+            <p:ph type="title"/>
+          </p:nvPr>
+        </p:nvSpPr>
+        <p:spPr/>
+        <p:txBody>
+          <a:bodyPr/>
+          <a:lstStyle/>
+          <a:p>
+            <a:r>
+              <a:rPr lang="en-US" dirty="0" smtClean="0"/>
+              <a:t>Poisson Blending</a:t>
+            </a:r>
+            <a:endParaRPr lang="en-US" dirty="0"/>
+          </a:p>
+        </p:txBody>
+      </p:sp>
+      <p:sp>
+        <p:nvSpPr>
+          <p:cNvPr id="3" name="Content Placeholder 2"/>
+          <p:cNvSpPr>
+            <a:spLocks noGrp="1"/>
+          </p:cNvSpPr>
+          <p:nvPr>
+            <p:ph idx="1"/>
+          </p:nvPr>
+        </p:nvSpPr>
+        <p:spPr/>
+        <p:txBody>
+          <a:bodyPr/>
+          <a:lstStyle/>
+          <a:p>
+            <a:r>
+              <a:rPr lang="en-US" dirty="0" smtClean="0"/>
+              <a:t>For each pixel from the source image, we must solve an equation where the difference between the pixel and its neighbors is the same as the difference between the target pixel and its neighbors. We use a Laplacian filter to compute this difference.</a:t>
+            </a:r>
+          </a:p>
+          <a:p>
+            <a:r>
+              <a:rPr lang="en-US" dirty="0" smtClean="0"/>
+              <a:t>That’s a lot of equations with a lot of unknowns.</a:t>
+            </a:r>
+          </a:p>
+          <a:p>
+            <a:r>
+              <a:rPr lang="en-US" dirty="0" smtClean="0"/>
+              <a:t>Luckily we can use a matrix to solve all of the equations at once. It’s a big matrix though.</a:t>
+            </a:r>
+          </a:p>
+          <a:p>
+            <a:r>
+              <a:rPr lang="en-US" dirty="0" smtClean="0"/>
+              <a:t>It all boils down to A*x = b where A shows adjacency, b shows our known coefficients and x shows our resulting pixels. </a:t>
+            </a:r>
+            <a:endParaRPr lang="en-US" dirty="0"/>
+          </a:p>
+        </p:txBody>
+      </p:sp>
+    </p:spTree>
+    <p:extLst>
+      <p:ext uri="{BB962C8B-B14F-4D97-AF65-F5344CB8AC3E}">
+        <p14:creationId xmlns:p14="http://schemas.microsoft.com/office/powerpoint/2010/main" val="241519488"/>
+      </p:ext>
+    </p:extLst>
+  </p:cSld>
+  <p:clrMapOvr>
+    <a:masterClrMapping/>
+  </p:clrMapOvr>
+</p:sld>
+</file>
+
+<file path=ppt/slides/slide12.xml><?xml version="1.0" encoding="utf-8"?>
 <p:sld xmlns:a="http://schemas.openxmlformats.org/drawingml/2006/main" xmlns:r="http://schemas.openxmlformats.org/officeDocument/2006/relationships" xmlns:p="http://schemas.openxmlformats.org/presentationml/2006/main">
   <p:cSld>
     <p:spTree>

</xml_diff>

<commit_message>
Added Poisson Example to powerpoint
</commit_message>
<xml_diff>
--- a/534_pres.pptx
+++ b/534_pres.pptx
@@ -19,7 +19,8 @@
     <p:sldId id="264" r:id="rId13"/>
     <p:sldId id="265" r:id="rId14"/>
     <p:sldId id="267" r:id="rId15"/>
-    <p:sldId id="266" r:id="rId16"/>
+    <p:sldId id="272" r:id="rId16"/>
+    <p:sldId id="266" r:id="rId17"/>
   </p:sldIdLst>
   <p:sldSz cx="12192000" cy="6858000"/>
   <p:notesSz cx="6858000" cy="9144000"/>
@@ -1076,14 +1077,35 @@
         </dgm:presLayoutVars>
       </dgm:prSet>
       <dgm:spPr/>
+      <dgm:t>
+        <a:bodyPr/>
+        <a:lstStyle/>
+        <a:p>
+          <a:endParaRPr lang="en-US"/>
+        </a:p>
+      </dgm:t>
     </dgm:pt>
     <dgm:pt modelId="{2775E1BF-2D5B-7C43-AE4C-29EDDD9385A6}" type="pres">
       <dgm:prSet presAssocID="{9EBDBCA8-37AC-C747-8307-01CC1205F28E}" presName="sibTrans" presStyleLbl="sibTrans2D1" presStyleIdx="0" presStyleCnt="4"/>
       <dgm:spPr/>
+      <dgm:t>
+        <a:bodyPr/>
+        <a:lstStyle/>
+        <a:p>
+          <a:endParaRPr lang="en-US"/>
+        </a:p>
+      </dgm:t>
     </dgm:pt>
     <dgm:pt modelId="{25CA4689-2A55-BE45-B361-D114BEF493C9}" type="pres">
       <dgm:prSet presAssocID="{9EBDBCA8-37AC-C747-8307-01CC1205F28E}" presName="connectorText" presStyleLbl="sibTrans2D1" presStyleIdx="0" presStyleCnt="4"/>
       <dgm:spPr/>
+      <dgm:t>
+        <a:bodyPr/>
+        <a:lstStyle/>
+        <a:p>
+          <a:endParaRPr lang="en-US"/>
+        </a:p>
+      </dgm:t>
     </dgm:pt>
     <dgm:pt modelId="{E589A13C-74D7-3346-8656-8273E54FB12C}" type="pres">
       <dgm:prSet presAssocID="{E7D77789-D19A-9540-8A5A-4F8555AD74CC}" presName="node" presStyleLbl="node1" presStyleIdx="1" presStyleCnt="5">
@@ -1092,14 +1114,35 @@
         </dgm:presLayoutVars>
       </dgm:prSet>
       <dgm:spPr/>
+      <dgm:t>
+        <a:bodyPr/>
+        <a:lstStyle/>
+        <a:p>
+          <a:endParaRPr lang="en-US"/>
+        </a:p>
+      </dgm:t>
     </dgm:pt>
     <dgm:pt modelId="{590E1E2D-95E0-F54B-823A-1701BB5B62A7}" type="pres">
       <dgm:prSet presAssocID="{2B3EEBB5-4078-B447-A7AC-B66F1A1E975C}" presName="sibTrans" presStyleLbl="sibTrans2D1" presStyleIdx="1" presStyleCnt="4"/>
       <dgm:spPr/>
+      <dgm:t>
+        <a:bodyPr/>
+        <a:lstStyle/>
+        <a:p>
+          <a:endParaRPr lang="en-US"/>
+        </a:p>
+      </dgm:t>
     </dgm:pt>
     <dgm:pt modelId="{9C695EA9-6170-E149-B16D-F711C81F8F83}" type="pres">
       <dgm:prSet presAssocID="{2B3EEBB5-4078-B447-A7AC-B66F1A1E975C}" presName="connectorText" presStyleLbl="sibTrans2D1" presStyleIdx="1" presStyleCnt="4"/>
       <dgm:spPr/>
+      <dgm:t>
+        <a:bodyPr/>
+        <a:lstStyle/>
+        <a:p>
+          <a:endParaRPr lang="en-US"/>
+        </a:p>
+      </dgm:t>
     </dgm:pt>
     <dgm:pt modelId="{3FAB3615-0EB8-724E-9DDD-8C36B6E4A7A1}" type="pres">
       <dgm:prSet presAssocID="{90F0F106-FC5B-444F-90CF-187CFE89A63B}" presName="node" presStyleLbl="node1" presStyleIdx="2" presStyleCnt="5">
@@ -1108,14 +1151,35 @@
         </dgm:presLayoutVars>
       </dgm:prSet>
       <dgm:spPr/>
+      <dgm:t>
+        <a:bodyPr/>
+        <a:lstStyle/>
+        <a:p>
+          <a:endParaRPr lang="en-US"/>
+        </a:p>
+      </dgm:t>
     </dgm:pt>
     <dgm:pt modelId="{C330A8D0-62C0-7647-80D0-1B1D8E2AC668}" type="pres">
       <dgm:prSet presAssocID="{3598FE2E-B681-134E-B51C-82D47F92CB27}" presName="sibTrans" presStyleLbl="sibTrans2D1" presStyleIdx="2" presStyleCnt="4"/>
       <dgm:spPr/>
+      <dgm:t>
+        <a:bodyPr/>
+        <a:lstStyle/>
+        <a:p>
+          <a:endParaRPr lang="en-US"/>
+        </a:p>
+      </dgm:t>
     </dgm:pt>
     <dgm:pt modelId="{184C40AA-5F53-F042-9189-EAB587B17F7C}" type="pres">
       <dgm:prSet presAssocID="{3598FE2E-B681-134E-B51C-82D47F92CB27}" presName="connectorText" presStyleLbl="sibTrans2D1" presStyleIdx="2" presStyleCnt="4"/>
       <dgm:spPr/>
+      <dgm:t>
+        <a:bodyPr/>
+        <a:lstStyle/>
+        <a:p>
+          <a:endParaRPr lang="en-US"/>
+        </a:p>
+      </dgm:t>
     </dgm:pt>
     <dgm:pt modelId="{369CE24A-0E22-EF46-9D02-17707CACCBDA}" type="pres">
       <dgm:prSet presAssocID="{045013EC-7901-534C-8B8E-E348AAA27BF0}" presName="node" presStyleLbl="node1" presStyleIdx="3" presStyleCnt="5">
@@ -1124,14 +1188,35 @@
         </dgm:presLayoutVars>
       </dgm:prSet>
       <dgm:spPr/>
+      <dgm:t>
+        <a:bodyPr/>
+        <a:lstStyle/>
+        <a:p>
+          <a:endParaRPr lang="en-US"/>
+        </a:p>
+      </dgm:t>
     </dgm:pt>
     <dgm:pt modelId="{D17195DD-2FAE-0A46-9628-E06EAF5E6149}" type="pres">
       <dgm:prSet presAssocID="{EE158F42-23B5-F744-819A-ED4215733F25}" presName="sibTrans" presStyleLbl="sibTrans2D1" presStyleIdx="3" presStyleCnt="4"/>
       <dgm:spPr/>
+      <dgm:t>
+        <a:bodyPr/>
+        <a:lstStyle/>
+        <a:p>
+          <a:endParaRPr lang="en-US"/>
+        </a:p>
+      </dgm:t>
     </dgm:pt>
     <dgm:pt modelId="{B0BFDA82-0223-B542-95D4-E8249FEC267A}" type="pres">
       <dgm:prSet presAssocID="{EE158F42-23B5-F744-819A-ED4215733F25}" presName="connectorText" presStyleLbl="sibTrans2D1" presStyleIdx="3" presStyleCnt="4"/>
       <dgm:spPr/>
+      <dgm:t>
+        <a:bodyPr/>
+        <a:lstStyle/>
+        <a:p>
+          <a:endParaRPr lang="en-US"/>
+        </a:p>
+      </dgm:t>
     </dgm:pt>
     <dgm:pt modelId="{6E2BB16B-90DD-644D-A8AD-FD6EB959E509}" type="pres">
       <dgm:prSet presAssocID="{E93AE06F-D309-B344-A27A-091D2C6B64D1}" presName="node" presStyleLbl="node1" presStyleIdx="4" presStyleCnt="5">
@@ -1140,6 +1225,13 @@
         </dgm:presLayoutVars>
       </dgm:prSet>
       <dgm:spPr/>
+      <dgm:t>
+        <a:bodyPr/>
+        <a:lstStyle/>
+        <a:p>
+          <a:endParaRPr lang="en-US"/>
+        </a:p>
+      </dgm:t>
     </dgm:pt>
   </dgm:ptLst>
   <dgm:cxnLst>
@@ -1157,11 +1249,11 @@
     <dgm:cxn modelId="{869F49E0-31B8-CD42-A87B-DA9410B08916}" type="presOf" srcId="{3598FE2E-B681-134E-B51C-82D47F92CB27}" destId="{184C40AA-5F53-F042-9189-EAB587B17F7C}" srcOrd="1" destOrd="0" presId="urn:microsoft.com/office/officeart/2005/8/layout/process1"/>
     <dgm:cxn modelId="{CE972473-23A3-C941-B95B-CB04CF11C036}" srcId="{D410A61B-9352-594D-92B2-49809D6894F7}" destId="{E93AE06F-D309-B344-A27A-091D2C6B64D1}" srcOrd="4" destOrd="0" parTransId="{CB9A2F40-5363-4345-AEF0-CBFC5ECABFA8}" sibTransId="{51E09C1C-C95E-2340-A3C4-6EA1A0EAEBB1}"/>
     <dgm:cxn modelId="{260E454D-922D-9446-84D7-1F174C28260D}" type="presOf" srcId="{9EBDBCA8-37AC-C747-8307-01CC1205F28E}" destId="{25CA4689-2A55-BE45-B361-D114BEF493C9}" srcOrd="1" destOrd="0" presId="urn:microsoft.com/office/officeart/2005/8/layout/process1"/>
+    <dgm:cxn modelId="{4BE32BC8-300B-CA4C-B1DE-0E5D25A4E961}" type="presOf" srcId="{2B3EEBB5-4078-B447-A7AC-B66F1A1E975C}" destId="{9C695EA9-6170-E149-B16D-F711C81F8F83}" srcOrd="1" destOrd="0" presId="urn:microsoft.com/office/officeart/2005/8/layout/process1"/>
     <dgm:cxn modelId="{DA896CF3-4093-7C46-9DBF-DB2386D25631}" srcId="{D410A61B-9352-594D-92B2-49809D6894F7}" destId="{5A468017-4B18-7743-BE22-4BDAAF9F2C9A}" srcOrd="0" destOrd="0" parTransId="{3052306A-3841-D048-A421-B1A8B3B30F39}" sibTransId="{9EBDBCA8-37AC-C747-8307-01CC1205F28E}"/>
-    <dgm:cxn modelId="{4BE32BC8-300B-CA4C-B1DE-0E5D25A4E961}" type="presOf" srcId="{2B3EEBB5-4078-B447-A7AC-B66F1A1E975C}" destId="{9C695EA9-6170-E149-B16D-F711C81F8F83}" srcOrd="1" destOrd="0" presId="urn:microsoft.com/office/officeart/2005/8/layout/process1"/>
     <dgm:cxn modelId="{DD198553-BB6F-0343-B8B2-9CD97D653E96}" type="presOf" srcId="{5A468017-4B18-7743-BE22-4BDAAF9F2C9A}" destId="{ED626B74-BE43-964D-873B-E5C023D7C29A}" srcOrd="0" destOrd="0" presId="urn:microsoft.com/office/officeart/2005/8/layout/process1"/>
+    <dgm:cxn modelId="{A7C56AF2-D18F-9A44-B173-866C2F5801D9}" type="presOf" srcId="{E93AE06F-D309-B344-A27A-091D2C6B64D1}" destId="{6E2BB16B-90DD-644D-A8AD-FD6EB959E509}" srcOrd="0" destOrd="0" presId="urn:microsoft.com/office/officeart/2005/8/layout/process1"/>
     <dgm:cxn modelId="{B1B2B347-8EB7-574E-8238-344EB497816D}" srcId="{D410A61B-9352-594D-92B2-49809D6894F7}" destId="{045013EC-7901-534C-8B8E-E348AAA27BF0}" srcOrd="3" destOrd="0" parTransId="{1DDE25B2-A535-7344-A7F0-A28363777164}" sibTransId="{EE158F42-23B5-F744-819A-ED4215733F25}"/>
-    <dgm:cxn modelId="{A7C56AF2-D18F-9A44-B173-866C2F5801D9}" type="presOf" srcId="{E93AE06F-D309-B344-A27A-091D2C6B64D1}" destId="{6E2BB16B-90DD-644D-A8AD-FD6EB959E509}" srcOrd="0" destOrd="0" presId="urn:microsoft.com/office/officeart/2005/8/layout/process1"/>
     <dgm:cxn modelId="{17127C32-5922-D044-B0AD-18A1C7F18363}" type="presParOf" srcId="{1496CEA9-8236-7C4B-B4C7-8FB49B738452}" destId="{ED626B74-BE43-964D-873B-E5C023D7C29A}" srcOrd="0" destOrd="0" presId="urn:microsoft.com/office/officeart/2005/8/layout/process1"/>
     <dgm:cxn modelId="{77D1BBF1-C67A-514B-A6B6-332F5D878E66}" type="presParOf" srcId="{1496CEA9-8236-7C4B-B4C7-8FB49B738452}" destId="{2775E1BF-2D5B-7C43-AE4C-29EDDD9385A6}" srcOrd="1" destOrd="0" presId="urn:microsoft.com/office/officeart/2005/8/layout/process1"/>
     <dgm:cxn modelId="{A38B99CB-F05E-B642-BF71-1B30CCC9583E}" type="presParOf" srcId="{2775E1BF-2D5B-7C43-AE4C-29EDDD9385A6}" destId="{25CA4689-2A55-BE45-B361-D114BEF493C9}" srcOrd="0" destOrd="0" presId="urn:microsoft.com/office/officeart/2005/8/layout/process1"/>
@@ -1257,7 +1349,7 @@
         </a:bodyPr>
         <a:lstStyle/>
         <a:p>
-          <a:pPr marL="0" lvl="0" indent="0" algn="ctr" defTabSz="800100">
+          <a:pPr lvl="0" algn="ctr" defTabSz="800100">
             <a:lnSpc>
               <a:spcPct val="90000"/>
             </a:lnSpc>
@@ -1267,7 +1359,6 @@
             <a:spcAft>
               <a:spcPct val="35000"/>
             </a:spcAft>
-            <a:buNone/>
           </a:pPr>
           <a:r>
             <a:rPr lang="en-US" sz="1800" kern="1200" dirty="0"/>
@@ -1346,7 +1437,7 @@
         </a:bodyPr>
         <a:lstStyle/>
         <a:p>
-          <a:pPr marL="0" lvl="0" indent="0" algn="ctr" defTabSz="622300">
+          <a:pPr lvl="0" algn="ctr" defTabSz="622300">
             <a:lnSpc>
               <a:spcPct val="90000"/>
             </a:lnSpc>
@@ -1356,7 +1447,6 @@
             <a:spcAft>
               <a:spcPct val="35000"/>
             </a:spcAft>
-            <a:buNone/>
           </a:pPr>
           <a:endParaRPr lang="en-US" sz="1400" kern="1200"/>
         </a:p>
@@ -1429,7 +1519,7 @@
         </a:bodyPr>
         <a:lstStyle/>
         <a:p>
-          <a:pPr marL="0" lvl="0" indent="0" algn="ctr" defTabSz="800100">
+          <a:pPr lvl="0" algn="ctr" defTabSz="800100">
             <a:lnSpc>
               <a:spcPct val="90000"/>
             </a:lnSpc>
@@ -1439,7 +1529,6 @@
             <a:spcAft>
               <a:spcPct val="35000"/>
             </a:spcAft>
-            <a:buNone/>
           </a:pPr>
           <a:r>
             <a:rPr lang="en-US" sz="1800" kern="1200" dirty="0"/>
@@ -1518,7 +1607,7 @@
         </a:bodyPr>
         <a:lstStyle/>
         <a:p>
-          <a:pPr marL="0" lvl="0" indent="0" algn="ctr" defTabSz="622300">
+          <a:pPr lvl="0" algn="ctr" defTabSz="622300">
             <a:lnSpc>
               <a:spcPct val="90000"/>
             </a:lnSpc>
@@ -1528,7 +1617,6 @@
             <a:spcAft>
               <a:spcPct val="35000"/>
             </a:spcAft>
-            <a:buNone/>
           </a:pPr>
           <a:endParaRPr lang="en-US" sz="1400" kern="1200"/>
         </a:p>
@@ -1601,7 +1689,7 @@
         </a:bodyPr>
         <a:lstStyle/>
         <a:p>
-          <a:pPr marL="0" lvl="0" indent="0" algn="ctr" defTabSz="800100">
+          <a:pPr lvl="0" algn="ctr" defTabSz="800100">
             <a:lnSpc>
               <a:spcPct val="90000"/>
             </a:lnSpc>
@@ -1611,7 +1699,6 @@
             <a:spcAft>
               <a:spcPct val="35000"/>
             </a:spcAft>
-            <a:buNone/>
           </a:pPr>
           <a:r>
             <a:rPr lang="en-US" sz="1800" kern="1200" dirty="0"/>
@@ -1690,7 +1777,7 @@
         </a:bodyPr>
         <a:lstStyle/>
         <a:p>
-          <a:pPr marL="0" lvl="0" indent="0" algn="ctr" defTabSz="622300">
+          <a:pPr lvl="0" algn="ctr" defTabSz="622300">
             <a:lnSpc>
               <a:spcPct val="90000"/>
             </a:lnSpc>
@@ -1700,7 +1787,6 @@
             <a:spcAft>
               <a:spcPct val="35000"/>
             </a:spcAft>
-            <a:buNone/>
           </a:pPr>
           <a:endParaRPr lang="en-US" sz="1400" kern="1200"/>
         </a:p>
@@ -1773,7 +1859,7 @@
         </a:bodyPr>
         <a:lstStyle/>
         <a:p>
-          <a:pPr marL="0" lvl="0" indent="0" algn="ctr" defTabSz="800100">
+          <a:pPr lvl="0" algn="ctr" defTabSz="800100">
             <a:lnSpc>
               <a:spcPct val="90000"/>
             </a:lnSpc>
@@ -1783,7 +1869,6 @@
             <a:spcAft>
               <a:spcPct val="35000"/>
             </a:spcAft>
-            <a:buNone/>
           </a:pPr>
           <a:r>
             <a:rPr lang="en-US" sz="1800" kern="1200" dirty="0"/>
@@ -1862,7 +1947,7 @@
         </a:bodyPr>
         <a:lstStyle/>
         <a:p>
-          <a:pPr marL="0" lvl="0" indent="0" algn="ctr" defTabSz="622300">
+          <a:pPr lvl="0" algn="ctr" defTabSz="622300">
             <a:lnSpc>
               <a:spcPct val="90000"/>
             </a:lnSpc>
@@ -1872,7 +1957,6 @@
             <a:spcAft>
               <a:spcPct val="35000"/>
             </a:spcAft>
-            <a:buNone/>
           </a:pPr>
           <a:endParaRPr lang="en-US" sz="1400" kern="1200"/>
         </a:p>
@@ -1945,7 +2029,7 @@
         </a:bodyPr>
         <a:lstStyle/>
         <a:p>
-          <a:pPr marL="0" lvl="0" indent="0" algn="ctr" defTabSz="800100">
+          <a:pPr lvl="0" algn="ctr" defTabSz="800100">
             <a:lnSpc>
               <a:spcPct val="90000"/>
             </a:lnSpc>
@@ -1955,7 +2039,6 @@
             <a:spcAft>
               <a:spcPct val="35000"/>
             </a:spcAft>
-            <a:buNone/>
           </a:pPr>
           <a:r>
             <a:rPr lang="en-US" sz="1800" kern="1200" dirty="0"/>
@@ -3247,7 +3330,7 @@
           <a:effectLst/>
           <a:extLst>
             <a:ext uri="{91240B29-F687-4f45-9708-019B960494DF}">
-              <a14:hiddenLine xmlns="" xmlns:a14="http://schemas.microsoft.com/office/drawing/2010/main" w="9525">
+              <a14:hiddenLine xmlns:a14="http://schemas.microsoft.com/office/drawing/2010/main" xmlns="" w="9525">
                 <a:solidFill>
                   <a:srgbClr val="000000"/>
                 </a:solidFill>
@@ -4757,7 +4840,7 @@
           <a:ln/>
           <a:extLst>
             <a:ext uri="{91240B29-F687-4f45-9708-019B960494DF}">
-              <a14:hiddenLine xmlns="" xmlns:a14="http://schemas.microsoft.com/office/drawing/2010/main" w="9525">
+              <a14:hiddenLine xmlns:a14="http://schemas.microsoft.com/office/drawing/2010/main" xmlns="" w="9525">
                 <a:solidFill>
                   <a:srgbClr val="000000"/>
                 </a:solidFill>
@@ -5029,7 +5112,7 @@
           <a:ln/>
           <a:extLst>
             <a:ext uri="{91240B29-F687-4f45-9708-019B960494DF}">
-              <a14:hiddenLine xmlns="" xmlns:a14="http://schemas.microsoft.com/office/drawing/2010/main" w="9525">
+              <a14:hiddenLine xmlns:a14="http://schemas.microsoft.com/office/drawing/2010/main" xmlns="" w="9525">
                 <a:solidFill>
                   <a:srgbClr val="000000"/>
                 </a:solidFill>
@@ -5309,7 +5392,7 @@
           <a:ln/>
           <a:extLst>
             <a:ext uri="{91240B29-F687-4f45-9708-019B960494DF}">
-              <a14:hiddenLine xmlns="" xmlns:a14="http://schemas.microsoft.com/office/drawing/2010/main" w="9525">
+              <a14:hiddenLine xmlns:a14="http://schemas.microsoft.com/office/drawing/2010/main" xmlns="" w="9525">
                 <a:solidFill>
                   <a:srgbClr val="000000"/>
                 </a:solidFill>
@@ -5929,7 +6012,7 @@
           <a:ln/>
           <a:extLst>
             <a:ext uri="{91240B29-F687-4f45-9708-019B960494DF}">
-              <a14:hiddenLine xmlns="" xmlns:a14="http://schemas.microsoft.com/office/drawing/2010/main" w="9525">
+              <a14:hiddenLine xmlns:a14="http://schemas.microsoft.com/office/drawing/2010/main" xmlns="" w="9525">
                 <a:solidFill>
                   <a:srgbClr val="000000"/>
                 </a:solidFill>
@@ -6265,7 +6348,7 @@
           <a:ln/>
           <a:extLst>
             <a:ext uri="{91240B29-F687-4f45-9708-019B960494DF}">
-              <a14:hiddenLine xmlns="" xmlns:a14="http://schemas.microsoft.com/office/drawing/2010/main" w="9525">
+              <a14:hiddenLine xmlns:a14="http://schemas.microsoft.com/office/drawing/2010/main" xmlns="" w="9525">
                 <a:solidFill>
                   <a:srgbClr val="000000"/>
                 </a:solidFill>
@@ -6739,7 +6822,7 @@
           <a:ln/>
           <a:extLst>
             <a:ext uri="{91240B29-F687-4f45-9708-019B960494DF}">
-              <a14:hiddenLine xmlns="" xmlns:a14="http://schemas.microsoft.com/office/drawing/2010/main" w="9525">
+              <a14:hiddenLine xmlns:a14="http://schemas.microsoft.com/office/drawing/2010/main" xmlns="" w="9525">
                 <a:solidFill>
                   <a:srgbClr val="000000"/>
                 </a:solidFill>
@@ -7162,7 +7245,7 @@
           <a:ln/>
           <a:extLst>
             <a:ext uri="{91240B29-F687-4f45-9708-019B960494DF}">
-              <a14:hiddenLine xmlns="" xmlns:a14="http://schemas.microsoft.com/office/drawing/2010/main" w="9525">
+              <a14:hiddenLine xmlns:a14="http://schemas.microsoft.com/office/drawing/2010/main" xmlns="" w="9525">
                 <a:solidFill>
                   <a:srgbClr val="000000"/>
                 </a:solidFill>
@@ -8400,9 +8483,17 @@
           <a:bodyPr/>
           <a:lstStyle/>
           <a:p>
+            <a:r>
+              <a:rPr lang="en-US" dirty="0"/>
+              <a:t/>
+            </a:r>
             <a:br>
               <a:rPr lang="en-US" dirty="0"/>
             </a:br>
+            <a:r>
+              <a:rPr lang="en-US" dirty="0"/>
+              <a:t/>
+            </a:r>
             <a:br>
               <a:rPr lang="en-US" dirty="0"/>
             </a:br>
@@ -9268,6 +9359,284 @@
 </file>
 
 <file path=ppt/slides/slide15.xml><?xml version="1.0" encoding="utf-8"?>
+<p:sld xmlns:a="http://schemas.openxmlformats.org/drawingml/2006/main" xmlns:r="http://schemas.openxmlformats.org/officeDocument/2006/relationships" xmlns:p="http://schemas.openxmlformats.org/presentationml/2006/main">
+  <p:cSld>
+    <p:spTree>
+      <p:nvGrpSpPr>
+        <p:cNvPr id="1" name=""/>
+        <p:cNvGrpSpPr/>
+        <p:nvPr/>
+      </p:nvGrpSpPr>
+      <p:grpSpPr>
+        <a:xfrm>
+          <a:off x="0" y="0"/>
+          <a:ext cx="0" cy="0"/>
+          <a:chOff x="0" y="0"/>
+          <a:chExt cx="0" cy="0"/>
+        </a:xfrm>
+      </p:grpSpPr>
+      <p:sp>
+        <p:nvSpPr>
+          <p:cNvPr id="2" name="Title 1"/>
+          <p:cNvSpPr>
+            <a:spLocks noGrp="1"/>
+          </p:cNvSpPr>
+          <p:nvPr>
+            <p:ph type="title"/>
+          </p:nvPr>
+        </p:nvSpPr>
+        <p:spPr/>
+        <p:txBody>
+          <a:bodyPr/>
+          <a:lstStyle/>
+          <a:p>
+            <a:r>
+              <a:rPr lang="en-US" dirty="0" smtClean="0"/>
+              <a:t>Poisson Example</a:t>
+            </a:r>
+            <a:endParaRPr lang="en-US" dirty="0"/>
+          </a:p>
+        </p:txBody>
+      </p:sp>
+      <p:pic>
+        <p:nvPicPr>
+          <p:cNvPr id="4" name="Content Placeholder 3"/>
+          <p:cNvPicPr>
+            <a:picLocks noGrp="1" noChangeAspect="1"/>
+          </p:cNvPicPr>
+          <p:nvPr>
+            <p:ph idx="1"/>
+          </p:nvPr>
+        </p:nvPicPr>
+        <p:blipFill>
+          <a:blip r:embed="rId2">
+            <a:extLst>
+              <a:ext uri="{28A0092B-C50C-407E-A947-70E740481C1C}">
+                <a14:useLocalDpi xmlns:a14="http://schemas.microsoft.com/office/drawing/2010/main" val="0"/>
+              </a:ext>
+            </a:extLst>
+          </a:blip>
+          <a:stretch>
+            <a:fillRect/>
+          </a:stretch>
+        </p:blipFill>
+        <p:spPr>
+          <a:xfrm>
+            <a:off x="121383" y="1504400"/>
+            <a:ext cx="3524250" cy="2400300"/>
+          </a:xfrm>
+        </p:spPr>
+      </p:pic>
+      <p:pic>
+        <p:nvPicPr>
+          <p:cNvPr id="5" name="Picture 4"/>
+          <p:cNvPicPr>
+            <a:picLocks noChangeAspect="1"/>
+          </p:cNvPicPr>
+          <p:nvPr/>
+        </p:nvPicPr>
+        <p:blipFill>
+          <a:blip r:embed="rId3">
+            <a:extLst>
+              <a:ext uri="{28A0092B-C50C-407E-A947-70E740481C1C}">
+                <a14:useLocalDpi xmlns:a14="http://schemas.microsoft.com/office/drawing/2010/main" val="0"/>
+              </a:ext>
+            </a:extLst>
+          </a:blip>
+          <a:stretch>
+            <a:fillRect/>
+          </a:stretch>
+        </p:blipFill>
+        <p:spPr>
+          <a:xfrm>
+            <a:off x="121383" y="3991462"/>
+            <a:ext cx="3524250" cy="2400300"/>
+          </a:xfrm>
+          <a:prstGeom prst="rect">
+            <a:avLst/>
+          </a:prstGeom>
+        </p:spPr>
+      </p:pic>
+      <p:pic>
+        <p:nvPicPr>
+          <p:cNvPr id="6" name="Picture 5"/>
+          <p:cNvPicPr>
+            <a:picLocks noChangeAspect="1"/>
+          </p:cNvPicPr>
+          <p:nvPr/>
+        </p:nvPicPr>
+        <p:blipFill>
+          <a:blip r:embed="rId4">
+            <a:extLst>
+              <a:ext uri="{28A0092B-C50C-407E-A947-70E740481C1C}">
+                <a14:useLocalDpi xmlns:a14="http://schemas.microsoft.com/office/drawing/2010/main" val="0"/>
+              </a:ext>
+            </a:extLst>
+          </a:blip>
+          <a:stretch>
+            <a:fillRect/>
+          </a:stretch>
+        </p:blipFill>
+        <p:spPr>
+          <a:xfrm>
+            <a:off x="3825875" y="3119804"/>
+            <a:ext cx="3524250" cy="2400300"/>
+          </a:xfrm>
+          <a:prstGeom prst="rect">
+            <a:avLst/>
+          </a:prstGeom>
+        </p:spPr>
+      </p:pic>
+      <p:pic>
+        <p:nvPicPr>
+          <p:cNvPr id="8" name="Picture 7"/>
+          <p:cNvPicPr>
+            <a:picLocks noChangeAspect="1"/>
+          </p:cNvPicPr>
+          <p:nvPr/>
+        </p:nvPicPr>
+        <p:blipFill>
+          <a:blip r:embed="rId5">
+            <a:extLst>
+              <a:ext uri="{28A0092B-C50C-407E-A947-70E740481C1C}">
+                <a14:useLocalDpi xmlns:a14="http://schemas.microsoft.com/office/drawing/2010/main" val="0"/>
+              </a:ext>
+            </a:extLst>
+          </a:blip>
+          <a:stretch>
+            <a:fillRect/>
+          </a:stretch>
+        </p:blipFill>
+        <p:spPr>
+          <a:xfrm>
+            <a:off x="7857748" y="3119804"/>
+            <a:ext cx="3524250" cy="2400300"/>
+          </a:xfrm>
+          <a:prstGeom prst="rect">
+            <a:avLst/>
+          </a:prstGeom>
+        </p:spPr>
+      </p:pic>
+      <p:sp>
+        <p:nvSpPr>
+          <p:cNvPr id="9" name="TextBox 8"/>
+          <p:cNvSpPr txBox="1"/>
+          <p:nvPr/>
+        </p:nvSpPr>
+        <p:spPr>
+          <a:xfrm>
+            <a:off x="8764088" y="2399124"/>
+            <a:ext cx="1711569" cy="646331"/>
+          </a:xfrm>
+          <a:prstGeom prst="rect">
+            <a:avLst/>
+          </a:prstGeom>
+          <a:noFill/>
+        </p:spPr>
+        <p:txBody>
+          <a:bodyPr wrap="square" rtlCol="0">
+            <a:spAutoFit/>
+          </a:bodyPr>
+          <a:lstStyle/>
+          <a:p>
+            <a:r>
+              <a:rPr lang="en-US" dirty="0" smtClean="0"/>
+              <a:t>Poisson Blend Result </a:t>
+            </a:r>
+            <a:r>
+              <a:rPr lang="en-US" dirty="0"/>
+              <a:t>C</a:t>
+            </a:r>
+            <a:r>
+              <a:rPr lang="en-US" dirty="0" smtClean="0"/>
+              <a:t>utout</a:t>
+            </a:r>
+            <a:endParaRPr lang="en-US" dirty="0"/>
+          </a:p>
+        </p:txBody>
+      </p:sp>
+      <p:sp>
+        <p:nvSpPr>
+          <p:cNvPr id="10" name="TextBox 9"/>
+          <p:cNvSpPr txBox="1"/>
+          <p:nvPr/>
+        </p:nvSpPr>
+        <p:spPr>
+          <a:xfrm>
+            <a:off x="664308" y="4650371"/>
+            <a:ext cx="2438400" cy="646331"/>
+          </a:xfrm>
+          <a:prstGeom prst="rect">
+            <a:avLst/>
+          </a:prstGeom>
+          <a:noFill/>
+        </p:spPr>
+        <p:txBody>
+          <a:bodyPr wrap="square" rtlCol="0">
+            <a:spAutoFit/>
+          </a:bodyPr>
+          <a:lstStyle/>
+          <a:p>
+            <a:r>
+              <a:rPr lang="en-US" dirty="0" smtClean="0">
+                <a:solidFill>
+                  <a:schemeClr val="bg1"/>
+                </a:solidFill>
+              </a:rPr>
+              <a:t>Source Cutout and Mask</a:t>
+            </a:r>
+            <a:endParaRPr lang="en-US" dirty="0">
+              <a:solidFill>
+                <a:schemeClr val="bg1"/>
+              </a:solidFill>
+            </a:endParaRPr>
+          </a:p>
+        </p:txBody>
+      </p:sp>
+      <p:sp>
+        <p:nvSpPr>
+          <p:cNvPr id="11" name="TextBox 10"/>
+          <p:cNvSpPr txBox="1"/>
+          <p:nvPr/>
+        </p:nvSpPr>
+        <p:spPr>
+          <a:xfrm>
+            <a:off x="4462585" y="2594708"/>
+            <a:ext cx="2047630" cy="369332"/>
+          </a:xfrm>
+          <a:prstGeom prst="rect">
+            <a:avLst/>
+          </a:prstGeom>
+          <a:noFill/>
+        </p:spPr>
+        <p:txBody>
+          <a:bodyPr wrap="square" rtlCol="0">
+            <a:spAutoFit/>
+          </a:bodyPr>
+          <a:lstStyle/>
+          <a:p>
+            <a:r>
+              <a:rPr lang="en-US" dirty="0" smtClean="0"/>
+              <a:t>Target Cutout</a:t>
+            </a:r>
+            <a:endParaRPr lang="en-US" dirty="0"/>
+          </a:p>
+        </p:txBody>
+      </p:sp>
+    </p:spTree>
+    <p:extLst>
+      <p:ext uri="{BB962C8B-B14F-4D97-AF65-F5344CB8AC3E}">
+        <p14:creationId xmlns:p14="http://schemas.microsoft.com/office/powerpoint/2010/main" val="895189709"/>
+      </p:ext>
+    </p:extLst>
+  </p:cSld>
+  <p:clrMapOvr>
+    <a:masterClrMapping/>
+  </p:clrMapOvr>
+</p:sld>
+</file>
+
+<file path=ppt/slides/slide16.xml><?xml version="1.0" encoding="utf-8"?>
 <p:sld xmlns:a="http://schemas.openxmlformats.org/drawingml/2006/main" xmlns:r="http://schemas.openxmlformats.org/officeDocument/2006/relationships" xmlns:p="http://schemas.openxmlformats.org/presentationml/2006/main">
   <p:cSld>
     <p:spTree>

</xml_diff>